<commit_message>
Checks guessing in categorization
</commit_message>
<xml_diff>
--- a/presentation/exp birds eye veiw.pptx
+++ b/presentation/exp birds eye veiw.pptx
@@ -6,6 +6,7 @@
   </p:sldMasterIdLst>
   <p:sldIdLst>
     <p:sldId id="256" r:id="rId2"/>
+    <p:sldId id="257" r:id="rId3"/>
   </p:sldIdLst>
   <p:sldSz cx="12192000" cy="6858000"/>
   <p:notesSz cx="6858000" cy="9144000"/>
@@ -112,6 +113,34 @@
 </p:presentation>
 </file>
 
+<file path=ppt/ink/ink1.xml><?xml version="1.0" encoding="utf-8"?>
+<inkml:ink xmlns:inkml="http://www.w3.org/2003/InkML">
+  <inkml:definitions>
+    <inkml:context xml:id="ctx0">
+      <inkml:inkSource xml:id="inkSrc0">
+        <inkml:traceFormat>
+          <inkml:channel name="X" type="integer" min="-2.14748E9" max="2.14748E9" units="cm"/>
+          <inkml:channel name="Y" type="integer" min="-2.14748E9" max="2.14748E9" units="cm"/>
+          <inkml:channel name="F" type="integer" max="32767" units="dev"/>
+        </inkml:traceFormat>
+        <inkml:channelProperties>
+          <inkml:channelProperty channel="X" name="resolution" value="1000" units="1/cm"/>
+          <inkml:channelProperty channel="Y" name="resolution" value="1000" units="1/cm"/>
+          <inkml:channelProperty channel="F" name="resolution" value="0" units="1/dev"/>
+        </inkml:channelProperties>
+      </inkml:inkSource>
+      <inkml:timestamp xml:id="ts0" timeString="2022-01-17T15:36:53.769"/>
+    </inkml:context>
+    <inkml:brush xml:id="br0">
+      <inkml:brushProperty name="width" value="0.2" units="cm"/>
+      <inkml:brushProperty name="height" value="0.2" units="cm"/>
+      <inkml:brushProperty name="color" value="#E71224"/>
+    </inkml:brush>
+  </inkml:definitions>
+  <inkml:trace contextRef="#ctx0" brushRef="#br0">2682 5459 24575,'-5'-14'0,"1"5"0,-4-24 0,1 0 0,-3-47 0,-1-9 0,-12-158 0,22 223 0,-2-299 0,4 182 0,-2 32 0,3-124 0,18 64 0,-8 85 0,12-65 0,3-26 0,-21 113 0,3 1 0,20-75 0,-1 33 0,21-65 0,-41 143 0,1 0 0,0 1 0,2-1 0,0 2 0,21-31 0,187-225 0,-139 182 0,-66 83 0,0 0 0,0 1 0,2 1 0,-1 1 0,25-15 0,7-4 0,11-10 0,-17 14 0,-2-3 0,46-42 0,-56 43 0,59-45 0,-45 39 0,41-41 0,-77 68 0,2-1 0,11-18 0,4-3 0,-12 17 0,-1-2 0,0 1 0,12-23 0,21-47 0,-25 44 0,68-141 0,-82 169 0,-2 0 0,1-1 0,-2 0 0,1 1 0,-2-1 0,0 0 0,0 0 0,-1 0 0,0 0 0,-1 0 0,-3-14 0,0 15 0,0-1 0,0 1 0,-1 0 0,0 0 0,-1 0 0,-14-17 0,7 7 0,-8-12 0,3 2 0,-43-53 0,57 81 0,0-1 0,0 0 0,0 1 0,-1 0 0,-7-4 0,-14-10 0,13 6 0,-13-10 0,-41-27 0,57 42 0,1 1 0,-1 0 0,0 0 0,0 1 0,-1 1 0,0 0 0,1 0 0,-19-2 0,-73 5 0,51 1 0,43-1 0,-1 1 0,1 1 0,0-1 0,-16 6 0,-31 15 0,2 3 0,29-12 0,-32 11 0,36-16 0,-30 17 0,-15 6 0,43-21 0,-39 22 0,39-18 0,-36 14 0,24-14 0,16-5 0,-2-2 0,-21 6 0,-34 4 0,-132 10 0,185-26 0,-191 9 0,84-14 0,-139-23 0,116 3 0,-15-8 0,78 13 0,49 9 0,-41-15 0,17 5 0,-11-2 0,-211-71 0,153 36 0,108 44 0,-27-17 0,32 17 0,0 2 0,-34-15 0,43 21 0,-1-1 0,1 0 0,1-1 0,-1-1 0,-12-11 0,7 6 0,-1-1 0,-110-79 0,119 87 0,0 0 0,0-1 0,-14-14 0,-4-5 0,-79-80 0,63 60 0,-5-7 0,28 32 0,0 0 0,-24-40 0,7 11 0,27 36 0,0-1 0,1 0 0,-10-27 0,10 23 0,5 12 34,1 0 1,0 0-1,0 0 0,0 0 0,1-1 0,0 1 0,0 0 0,1-1 0,1-13 1,0 17-125,-1-1 0,1 1 0,0 0 0,0 0 0,1 0 1,-1 0-1,1 0 0,0 0 0,0 0 0,0 1 1,1-1-1,-1 1 0,1-1 0,0 1 0,0 0 0,0 0 1,0 0-1,6-3 0</inkml:trace>
+</inkml:ink>
+</file>
+
 <file path=ppt/slideLayouts/slideLayout1.xml><?xml version="1.0" encoding="utf-8"?>
 <p:sldLayout xmlns:a="http://schemas.openxmlformats.org/drawingml/2006/main" xmlns:r="http://schemas.openxmlformats.org/officeDocument/2006/relationships" xmlns:p="http://schemas.openxmlformats.org/presentationml/2006/main" type="title" preserve="1">
   <p:cSld name="Title Slide">
@@ -261,7 +290,7 @@
           <a:p>
             <a:fld id="{B3DC5803-524A-4535-9048-D4846558C48F}" type="datetimeFigureOut">
               <a:rPr lang="he-IL" smtClean="0"/>
-              <a:t>ב'/שבט/תשפ"ב</a:t>
+              <a:t>ט"ו/שבט/תשפ"ב</a:t>
             </a:fld>
             <a:endParaRPr lang="he-IL"/>
           </a:p>
@@ -461,7 +490,7 @@
           <a:p>
             <a:fld id="{B3DC5803-524A-4535-9048-D4846558C48F}" type="datetimeFigureOut">
               <a:rPr lang="he-IL" smtClean="0"/>
-              <a:t>ב'/שבט/תשפ"ב</a:t>
+              <a:t>ט"ו/שבט/תשפ"ב</a:t>
             </a:fld>
             <a:endParaRPr lang="he-IL"/>
           </a:p>
@@ -671,7 +700,7 @@
           <a:p>
             <a:fld id="{B3DC5803-524A-4535-9048-D4846558C48F}" type="datetimeFigureOut">
               <a:rPr lang="he-IL" smtClean="0"/>
-              <a:t>ב'/שבט/תשפ"ב</a:t>
+              <a:t>ט"ו/שבט/תשפ"ב</a:t>
             </a:fld>
             <a:endParaRPr lang="he-IL"/>
           </a:p>
@@ -871,7 +900,7 @@
           <a:p>
             <a:fld id="{B3DC5803-524A-4535-9048-D4846558C48F}" type="datetimeFigureOut">
               <a:rPr lang="he-IL" smtClean="0"/>
-              <a:t>ב'/שבט/תשפ"ב</a:t>
+              <a:t>ט"ו/שבט/תשפ"ב</a:t>
             </a:fld>
             <a:endParaRPr lang="he-IL"/>
           </a:p>
@@ -1147,7 +1176,7 @@
           <a:p>
             <a:fld id="{B3DC5803-524A-4535-9048-D4846558C48F}" type="datetimeFigureOut">
               <a:rPr lang="he-IL" smtClean="0"/>
-              <a:t>ב'/שבט/תשפ"ב</a:t>
+              <a:t>ט"ו/שבט/תשפ"ב</a:t>
             </a:fld>
             <a:endParaRPr lang="he-IL"/>
           </a:p>
@@ -1415,7 +1444,7 @@
           <a:p>
             <a:fld id="{B3DC5803-524A-4535-9048-D4846558C48F}" type="datetimeFigureOut">
               <a:rPr lang="he-IL" smtClean="0"/>
-              <a:t>ב'/שבט/תשפ"ב</a:t>
+              <a:t>ט"ו/שבט/תשפ"ב</a:t>
             </a:fld>
             <a:endParaRPr lang="he-IL"/>
           </a:p>
@@ -1830,7 +1859,7 @@
           <a:p>
             <a:fld id="{B3DC5803-524A-4535-9048-D4846558C48F}" type="datetimeFigureOut">
               <a:rPr lang="he-IL" smtClean="0"/>
-              <a:t>ב'/שבט/תשפ"ב</a:t>
+              <a:t>ט"ו/שבט/תשפ"ב</a:t>
             </a:fld>
             <a:endParaRPr lang="he-IL"/>
           </a:p>
@@ -1972,7 +2001,7 @@
           <a:p>
             <a:fld id="{B3DC5803-524A-4535-9048-D4846558C48F}" type="datetimeFigureOut">
               <a:rPr lang="he-IL" smtClean="0"/>
-              <a:t>ב'/שבט/תשפ"ב</a:t>
+              <a:t>ט"ו/שבט/תשפ"ב</a:t>
             </a:fld>
             <a:endParaRPr lang="he-IL"/>
           </a:p>
@@ -2085,7 +2114,7 @@
           <a:p>
             <a:fld id="{B3DC5803-524A-4535-9048-D4846558C48F}" type="datetimeFigureOut">
               <a:rPr lang="he-IL" smtClean="0"/>
-              <a:t>ב'/שבט/תשפ"ב</a:t>
+              <a:t>ט"ו/שבט/תשפ"ב</a:t>
             </a:fld>
             <a:endParaRPr lang="he-IL"/>
           </a:p>
@@ -2398,7 +2427,7 @@
           <a:p>
             <a:fld id="{B3DC5803-524A-4535-9048-D4846558C48F}" type="datetimeFigureOut">
               <a:rPr lang="he-IL" smtClean="0"/>
-              <a:t>ב'/שבט/תשפ"ב</a:t>
+              <a:t>ט"ו/שבט/תשפ"ב</a:t>
             </a:fld>
             <a:endParaRPr lang="he-IL"/>
           </a:p>
@@ -2687,7 +2716,7 @@
           <a:p>
             <a:fld id="{B3DC5803-524A-4535-9048-D4846558C48F}" type="datetimeFigureOut">
               <a:rPr lang="he-IL" smtClean="0"/>
-              <a:t>ב'/שבט/תשפ"ב</a:t>
+              <a:t>ט"ו/שבט/תשפ"ב</a:t>
             </a:fld>
             <a:endParaRPr lang="he-IL"/>
           </a:p>
@@ -2930,7 +2959,7 @@
           <a:p>
             <a:fld id="{B3DC5803-524A-4535-9048-D4846558C48F}" type="datetimeFigureOut">
               <a:rPr lang="he-IL" smtClean="0"/>
-              <a:t>ב'/שבט/תשפ"ב</a:t>
+              <a:t>ט"ו/שבט/תשפ"ב</a:t>
             </a:fld>
             <a:endParaRPr lang="he-IL"/>
           </a:p>
@@ -8433,6 +8462,430 @@
 </p:sld>
 </file>
 
+<file path=ppt/slides/slide2.xml><?xml version="1.0" encoding="utf-8"?>
+<p:sld xmlns:a="http://schemas.openxmlformats.org/drawingml/2006/main" xmlns:r="http://schemas.openxmlformats.org/officeDocument/2006/relationships" xmlns:p="http://schemas.openxmlformats.org/presentationml/2006/main">
+  <p:cSld>
+    <p:spTree>
+      <p:nvGrpSpPr>
+        <p:cNvPr id="1" name=""/>
+        <p:cNvGrpSpPr/>
+        <p:nvPr/>
+      </p:nvGrpSpPr>
+      <p:grpSpPr>
+        <a:xfrm>
+          <a:off x="0" y="0"/>
+          <a:ext cx="0" cy="0"/>
+          <a:chOff x="0" y="0"/>
+          <a:chExt cx="0" cy="0"/>
+        </a:xfrm>
+      </p:grpSpPr>
+      <p:cxnSp>
+        <p:nvCxnSpPr>
+          <p:cNvPr id="33" name="Straight Connector 32">
+            <a:extLst>
+              <a:ext uri="{FF2B5EF4-FFF2-40B4-BE49-F238E27FC236}">
+                <a16:creationId xmlns:a16="http://schemas.microsoft.com/office/drawing/2014/main" id="{F2EEAC43-DBD2-43BC-94FE-7EE2977FAC3E}"/>
+              </a:ext>
+            </a:extLst>
+          </p:cNvPr>
+          <p:cNvCxnSpPr>
+            <a:cxnSpLocks/>
+          </p:cNvCxnSpPr>
+          <p:nvPr/>
+        </p:nvCxnSpPr>
+        <p:spPr>
+          <a:xfrm>
+            <a:off x="5605134" y="4818960"/>
+            <a:ext cx="2239861" cy="0"/>
+          </a:xfrm>
+          <a:prstGeom prst="line">
+            <a:avLst/>
+          </a:prstGeom>
+          <a:ln w="38100">
+            <a:solidFill>
+              <a:schemeClr val="tx1"/>
+            </a:solidFill>
+          </a:ln>
+        </p:spPr>
+        <p:style>
+          <a:lnRef idx="1">
+            <a:schemeClr val="accent1"/>
+          </a:lnRef>
+          <a:fillRef idx="0">
+            <a:schemeClr val="accent1"/>
+          </a:fillRef>
+          <a:effectRef idx="0">
+            <a:schemeClr val="accent1"/>
+          </a:effectRef>
+          <a:fontRef idx="minor">
+            <a:schemeClr val="tx1"/>
+          </a:fontRef>
+        </p:style>
+      </p:cxnSp>
+      <p:cxnSp>
+        <p:nvCxnSpPr>
+          <p:cNvPr id="34" name="Straight Connector 33">
+            <a:extLst>
+              <a:ext uri="{FF2B5EF4-FFF2-40B4-BE49-F238E27FC236}">
+                <a16:creationId xmlns:a16="http://schemas.microsoft.com/office/drawing/2014/main" id="{851D5CFF-D1B0-4664-9301-77D9B93E4D83}"/>
+              </a:ext>
+            </a:extLst>
+          </p:cNvPr>
+          <p:cNvCxnSpPr>
+            <a:cxnSpLocks/>
+          </p:cNvCxnSpPr>
+          <p:nvPr/>
+        </p:nvCxnSpPr>
+        <p:spPr>
+          <a:xfrm flipV="1">
+            <a:off x="5605134" y="2595877"/>
+            <a:ext cx="0" cy="2223084"/>
+          </a:xfrm>
+          <a:prstGeom prst="line">
+            <a:avLst/>
+          </a:prstGeom>
+          <a:ln w="38100">
+            <a:solidFill>
+              <a:schemeClr val="tx1"/>
+            </a:solidFill>
+          </a:ln>
+        </p:spPr>
+        <p:style>
+          <a:lnRef idx="1">
+            <a:schemeClr val="accent1"/>
+          </a:lnRef>
+          <a:fillRef idx="0">
+            <a:schemeClr val="accent1"/>
+          </a:fillRef>
+          <a:effectRef idx="0">
+            <a:schemeClr val="accent1"/>
+          </a:effectRef>
+          <a:fontRef idx="minor">
+            <a:schemeClr val="tx1"/>
+          </a:fontRef>
+        </p:style>
+      </p:cxnSp>
+      <p:sp>
+        <p:nvSpPr>
+          <p:cNvPr id="35" name="TextBox 34">
+            <a:extLst>
+              <a:ext uri="{FF2B5EF4-FFF2-40B4-BE49-F238E27FC236}">
+                <a16:creationId xmlns:a16="http://schemas.microsoft.com/office/drawing/2014/main" id="{E143FC0A-2DA1-4EEA-8EBF-BFC31A474CE0}"/>
+              </a:ext>
+            </a:extLst>
+          </p:cNvPr>
+          <p:cNvSpPr txBox="1"/>
+          <p:nvPr/>
+        </p:nvSpPr>
+        <p:spPr>
+          <a:xfrm>
+            <a:off x="4623623" y="3455748"/>
+            <a:ext cx="914400" cy="369332"/>
+          </a:xfrm>
+          <a:prstGeom prst="rect">
+            <a:avLst/>
+          </a:prstGeom>
+          <a:noFill/>
+        </p:spPr>
+        <p:txBody>
+          <a:bodyPr wrap="square" rtlCol="1">
+            <a:spAutoFit/>
+          </a:bodyPr>
+          <a:lstStyle/>
+          <a:p>
+            <a:r>
+              <a:rPr lang="en-US" dirty="0"/>
+              <a:t>Z index</a:t>
+            </a:r>
+            <a:endParaRPr lang="he-IL" dirty="0"/>
+          </a:p>
+        </p:txBody>
+      </p:sp>
+      <p:sp>
+        <p:nvSpPr>
+          <p:cNvPr id="36" name="TextBox 35">
+            <a:extLst>
+              <a:ext uri="{FF2B5EF4-FFF2-40B4-BE49-F238E27FC236}">
+                <a16:creationId xmlns:a16="http://schemas.microsoft.com/office/drawing/2014/main" id="{8D6742F8-85EF-444A-A252-43EE2FC78D8D}"/>
+              </a:ext>
+            </a:extLst>
+          </p:cNvPr>
+          <p:cNvSpPr txBox="1"/>
+          <p:nvPr/>
+        </p:nvSpPr>
+        <p:spPr>
+          <a:xfrm>
+            <a:off x="6393700" y="4940600"/>
+            <a:ext cx="914400" cy="369332"/>
+          </a:xfrm>
+          <a:prstGeom prst="rect">
+            <a:avLst/>
+          </a:prstGeom>
+          <a:noFill/>
+        </p:spPr>
+        <p:txBody>
+          <a:bodyPr wrap="square" rtlCol="1">
+            <a:spAutoFit/>
+          </a:bodyPr>
+          <a:lstStyle/>
+          <a:p>
+            <a:r>
+              <a:rPr lang="en-US" dirty="0"/>
+              <a:t>X pos</a:t>
+            </a:r>
+            <a:endParaRPr lang="he-IL" dirty="0"/>
+          </a:p>
+        </p:txBody>
+      </p:sp>
+      <p:sp>
+        <p:nvSpPr>
+          <p:cNvPr id="37" name="Rectangle: Rounded Corners 36">
+            <a:extLst>
+              <a:ext uri="{FF2B5EF4-FFF2-40B4-BE49-F238E27FC236}">
+                <a16:creationId xmlns:a16="http://schemas.microsoft.com/office/drawing/2014/main" id="{C23F2B7D-539C-4EB8-BB4A-DEE4ED2DF4ED}"/>
+              </a:ext>
+            </a:extLst>
+          </p:cNvPr>
+          <p:cNvSpPr/>
+          <p:nvPr/>
+        </p:nvSpPr>
+        <p:spPr>
+          <a:xfrm>
+            <a:off x="5739359" y="2210631"/>
+            <a:ext cx="2105636" cy="558661"/>
+          </a:xfrm>
+          <a:prstGeom prst="roundRect">
+            <a:avLst/>
+          </a:prstGeom>
+        </p:spPr>
+        <p:style>
+          <a:lnRef idx="2">
+            <a:schemeClr val="accent1">
+              <a:shade val="50000"/>
+            </a:schemeClr>
+          </a:lnRef>
+          <a:fillRef idx="1">
+            <a:schemeClr val="accent1"/>
+          </a:fillRef>
+          <a:effectRef idx="0">
+            <a:schemeClr val="accent1"/>
+          </a:effectRef>
+          <a:fontRef idx="minor">
+            <a:schemeClr val="lt1"/>
+          </a:fontRef>
+        </p:style>
+        <p:txBody>
+          <a:bodyPr rtlCol="1" anchor="ctr"/>
+          <a:lstStyle/>
+          <a:p>
+            <a:pPr algn="ctr"/>
+            <a:r>
+              <a:rPr lang="en-US" dirty="0"/>
+              <a:t>Screen</a:t>
+            </a:r>
+          </a:p>
+          <a:p>
+            <a:pPr algn="ctr"/>
+            <a:endParaRPr lang="he-IL" dirty="0"/>
+          </a:p>
+        </p:txBody>
+      </p:sp>
+      <p:sp>
+        <p:nvSpPr>
+          <p:cNvPr id="8" name="TextBox 7">
+            <a:extLst>
+              <a:ext uri="{FF2B5EF4-FFF2-40B4-BE49-F238E27FC236}">
+                <a16:creationId xmlns:a16="http://schemas.microsoft.com/office/drawing/2014/main" id="{D54DDB98-729E-409C-99F1-3156FC56E9A2}"/>
+              </a:ext>
+            </a:extLst>
+          </p:cNvPr>
+          <p:cNvSpPr txBox="1"/>
+          <p:nvPr/>
+        </p:nvSpPr>
+        <p:spPr>
+          <a:xfrm>
+            <a:off x="9736666" y="1340114"/>
+            <a:ext cx="1744133" cy="738664"/>
+          </a:xfrm>
+          <a:prstGeom prst="rect">
+            <a:avLst/>
+          </a:prstGeom>
+          <a:noFill/>
+        </p:spPr>
+        <p:txBody>
+          <a:bodyPr wrap="square" rtlCol="1">
+            <a:spAutoFit/>
+          </a:bodyPr>
+          <a:lstStyle/>
+          <a:p>
+            <a:r>
+              <a:rPr lang="en-US" sz="1400" dirty="0"/>
+              <a:t>Is it possible that A is closer to the screen than B?</a:t>
+            </a:r>
+            <a:endParaRPr lang="he-IL" sz="1400" dirty="0"/>
+          </a:p>
+        </p:txBody>
+      </p:sp>
+      <p:sp>
+        <p:nvSpPr>
+          <p:cNvPr id="69" name="TextBox 68">
+            <a:extLst>
+              <a:ext uri="{FF2B5EF4-FFF2-40B4-BE49-F238E27FC236}">
+                <a16:creationId xmlns:a16="http://schemas.microsoft.com/office/drawing/2014/main" id="{03AE36CF-0649-453F-BA4A-A6246783EA5D}"/>
+              </a:ext>
+            </a:extLst>
+          </p:cNvPr>
+          <p:cNvSpPr txBox="1"/>
+          <p:nvPr/>
+        </p:nvSpPr>
+        <p:spPr>
+          <a:xfrm>
+            <a:off x="5730970" y="1854674"/>
+            <a:ext cx="2239860" cy="307777"/>
+          </a:xfrm>
+          <a:prstGeom prst="rect">
+            <a:avLst/>
+          </a:prstGeom>
+          <a:noFill/>
+        </p:spPr>
+        <p:txBody>
+          <a:bodyPr wrap="square" rtlCol="1">
+            <a:spAutoFit/>
+          </a:bodyPr>
+          <a:lstStyle/>
+          <a:p>
+            <a:r>
+              <a:rPr lang="en-US" sz="1400" b="1" dirty="0">
+                <a:solidFill>
+                  <a:schemeClr val="accent1"/>
+                </a:solidFill>
+              </a:rPr>
+              <a:t>Correct                </a:t>
+            </a:r>
+            <a:r>
+              <a:rPr lang="en-US" sz="1400" b="1" dirty="0" err="1">
+                <a:solidFill>
+                  <a:schemeClr val="accent1"/>
+                </a:solidFill>
+              </a:rPr>
+              <a:t>Incorreect</a:t>
+            </a:r>
+            <a:endParaRPr lang="he-IL" sz="1400" b="1" dirty="0">
+              <a:solidFill>
+                <a:schemeClr val="accent1"/>
+              </a:solidFill>
+            </a:endParaRPr>
+          </a:p>
+        </p:txBody>
+      </p:sp>
+      <p:sp>
+        <p:nvSpPr>
+          <p:cNvPr id="70" name="TextBox 69">
+            <a:extLst>
+              <a:ext uri="{FF2B5EF4-FFF2-40B4-BE49-F238E27FC236}">
+                <a16:creationId xmlns:a16="http://schemas.microsoft.com/office/drawing/2014/main" id="{3B326D6D-0AC2-4A8E-AB57-4C172F05959F}"/>
+              </a:ext>
+            </a:extLst>
+          </p:cNvPr>
+          <p:cNvSpPr txBox="1"/>
+          <p:nvPr/>
+        </p:nvSpPr>
+        <p:spPr>
+          <a:xfrm>
+            <a:off x="5730970" y="2463681"/>
+            <a:ext cx="2239860" cy="307777"/>
+          </a:xfrm>
+          <a:prstGeom prst="rect">
+            <a:avLst/>
+          </a:prstGeom>
+          <a:noFill/>
+        </p:spPr>
+        <p:txBody>
+          <a:bodyPr wrap="square" rtlCol="1">
+            <a:spAutoFit/>
+          </a:bodyPr>
+          <a:lstStyle/>
+          <a:p>
+            <a:r>
+              <a:rPr lang="en-US" sz="1400" b="1" dirty="0">
+                <a:solidFill>
+                  <a:schemeClr val="bg1"/>
+                </a:solidFill>
+              </a:rPr>
+              <a:t>   A                                   B</a:t>
+            </a:r>
+            <a:endParaRPr lang="he-IL" sz="1400" b="1" dirty="0">
+              <a:solidFill>
+                <a:schemeClr val="bg1"/>
+              </a:solidFill>
+            </a:endParaRPr>
+          </a:p>
+        </p:txBody>
+      </p:sp>
+      <mc:AlternateContent xmlns:mc="http://schemas.openxmlformats.org/markup-compatibility/2006">
+        <mc:Choice xmlns:p14="http://schemas.microsoft.com/office/powerpoint/2010/main" Requires="p14">
+          <p:contentPart p14:bwMode="auto" r:id="rId2">
+            <p14:nvContentPartPr>
+              <p14:cNvPr id="27" name="Ink 26">
+                <a:extLst>
+                  <a:ext uri="{FF2B5EF4-FFF2-40B4-BE49-F238E27FC236}">
+                    <a16:creationId xmlns:a16="http://schemas.microsoft.com/office/drawing/2014/main" id="{9C525368-2EDB-4341-A588-01695BB07A34}"/>
+                  </a:ext>
+                </a:extLst>
+              </p14:cNvPr>
+              <p14:cNvContentPartPr/>
+              <p14:nvPr/>
+            </p14:nvContentPartPr>
+            <p14:xfrm>
+              <a:off x="5964333" y="2784273"/>
+              <a:ext cx="1479600" cy="1965600"/>
+            </p14:xfrm>
+          </p:contentPart>
+        </mc:Choice>
+        <mc:Fallback>
+          <p:pic>
+            <p:nvPicPr>
+              <p:cNvPr id="27" name="Ink 26">
+                <a:extLst>
+                  <a:ext uri="{FF2B5EF4-FFF2-40B4-BE49-F238E27FC236}">
+                    <a16:creationId xmlns:a16="http://schemas.microsoft.com/office/drawing/2014/main" id="{9C525368-2EDB-4341-A588-01695BB07A34}"/>
+                  </a:ext>
+                </a:extLst>
+              </p:cNvPr>
+              <p:cNvPicPr/>
+              <p:nvPr/>
+            </p:nvPicPr>
+            <p:blipFill>
+              <a:blip r:embed="rId3"/>
+              <a:stretch>
+                <a:fillRect/>
+              </a:stretch>
+            </p:blipFill>
+            <p:spPr>
+              <a:xfrm>
+                <a:off x="5928333" y="2748273"/>
+                <a:ext cx="1551240" cy="2037240"/>
+              </a:xfrm>
+              <a:prstGeom prst="rect">
+                <a:avLst/>
+              </a:prstGeom>
+            </p:spPr>
+          </p:pic>
+        </mc:Fallback>
+      </mc:AlternateContent>
+    </p:spTree>
+    <p:extLst>
+      <p:ext uri="{BB962C8B-B14F-4D97-AF65-F5344CB8AC3E}">
+        <p14:creationId xmlns:p14="http://schemas.microsoft.com/office/powerpoint/2010/main" val="4190694341"/>
+      </p:ext>
+    </p:extLst>
+  </p:cSld>
+  <p:clrMapOvr>
+    <a:masterClrMapping/>
+  </p:clrMapOvr>
+</p:sld>
+</file>
+
 <file path=ppt/theme/theme1.xml><?xml version="1.0" encoding="utf-8"?>
 <a:theme xmlns:a="http://schemas.openxmlformats.org/drawingml/2006/main" name="Office Theme">
   <a:themeElements>

</xml_diff>

<commit_message>
Added pre reg progress
</commit_message>
<xml_diff>
--- a/presentation/exp birds eye veiw.pptx
+++ b/presentation/exp birds eye veiw.pptx
@@ -2660,7 +2660,7 @@
           <a:p>
             <a:fld id="{B3DC5803-524A-4535-9048-D4846558C48F}" type="datetimeFigureOut">
               <a:rPr lang="he-IL" smtClean="0"/>
-              <a:t>ט'/אדר א/תשפ"ב</a:t>
+              <a:t>כ"א/אדר א/תשפ"ב</a:t>
             </a:fld>
             <a:endParaRPr lang="he-IL"/>
           </a:p>
@@ -2860,7 +2860,7 @@
           <a:p>
             <a:fld id="{B3DC5803-524A-4535-9048-D4846558C48F}" type="datetimeFigureOut">
               <a:rPr lang="he-IL" smtClean="0"/>
-              <a:t>ט'/אדר א/תשפ"ב</a:t>
+              <a:t>כ"א/אדר א/תשפ"ב</a:t>
             </a:fld>
             <a:endParaRPr lang="he-IL"/>
           </a:p>
@@ -3070,7 +3070,7 @@
           <a:p>
             <a:fld id="{B3DC5803-524A-4535-9048-D4846558C48F}" type="datetimeFigureOut">
               <a:rPr lang="he-IL" smtClean="0"/>
-              <a:t>ט'/אדר א/תשפ"ב</a:t>
+              <a:t>כ"א/אדר א/תשפ"ב</a:t>
             </a:fld>
             <a:endParaRPr lang="he-IL"/>
           </a:p>
@@ -3270,7 +3270,7 @@
           <a:p>
             <a:fld id="{B3DC5803-524A-4535-9048-D4846558C48F}" type="datetimeFigureOut">
               <a:rPr lang="he-IL" smtClean="0"/>
-              <a:t>ט'/אדר א/תשפ"ב</a:t>
+              <a:t>כ"א/אדר א/תשפ"ב</a:t>
             </a:fld>
             <a:endParaRPr lang="he-IL"/>
           </a:p>
@@ -3546,7 +3546,7 @@
           <a:p>
             <a:fld id="{B3DC5803-524A-4535-9048-D4846558C48F}" type="datetimeFigureOut">
               <a:rPr lang="he-IL" smtClean="0"/>
-              <a:t>ט'/אדר א/תשפ"ב</a:t>
+              <a:t>כ"א/אדר א/תשפ"ב</a:t>
             </a:fld>
             <a:endParaRPr lang="he-IL"/>
           </a:p>
@@ -3814,7 +3814,7 @@
           <a:p>
             <a:fld id="{B3DC5803-524A-4535-9048-D4846558C48F}" type="datetimeFigureOut">
               <a:rPr lang="he-IL" smtClean="0"/>
-              <a:t>ט'/אדר א/תשפ"ב</a:t>
+              <a:t>כ"א/אדר א/תשפ"ב</a:t>
             </a:fld>
             <a:endParaRPr lang="he-IL"/>
           </a:p>
@@ -4229,7 +4229,7 @@
           <a:p>
             <a:fld id="{B3DC5803-524A-4535-9048-D4846558C48F}" type="datetimeFigureOut">
               <a:rPr lang="he-IL" smtClean="0"/>
-              <a:t>ט'/אדר א/תשפ"ב</a:t>
+              <a:t>כ"א/אדר א/תשפ"ב</a:t>
             </a:fld>
             <a:endParaRPr lang="he-IL"/>
           </a:p>
@@ -4371,7 +4371,7 @@
           <a:p>
             <a:fld id="{B3DC5803-524A-4535-9048-D4846558C48F}" type="datetimeFigureOut">
               <a:rPr lang="he-IL" smtClean="0"/>
-              <a:t>ט'/אדר א/תשפ"ב</a:t>
+              <a:t>כ"א/אדר א/תשפ"ב</a:t>
             </a:fld>
             <a:endParaRPr lang="he-IL"/>
           </a:p>
@@ -4484,7 +4484,7 @@
           <a:p>
             <a:fld id="{B3DC5803-524A-4535-9048-D4846558C48F}" type="datetimeFigureOut">
               <a:rPr lang="he-IL" smtClean="0"/>
-              <a:t>ט'/אדר א/תשפ"ב</a:t>
+              <a:t>כ"א/אדר א/תשפ"ב</a:t>
             </a:fld>
             <a:endParaRPr lang="he-IL"/>
           </a:p>
@@ -4797,7 +4797,7 @@
           <a:p>
             <a:fld id="{B3DC5803-524A-4535-9048-D4846558C48F}" type="datetimeFigureOut">
               <a:rPr lang="he-IL" smtClean="0"/>
-              <a:t>ט'/אדר א/תשפ"ב</a:t>
+              <a:t>כ"א/אדר א/תשפ"ב</a:t>
             </a:fld>
             <a:endParaRPr lang="he-IL"/>
           </a:p>
@@ -5086,7 +5086,7 @@
           <a:p>
             <a:fld id="{B3DC5803-524A-4535-9048-D4846558C48F}" type="datetimeFigureOut">
               <a:rPr lang="he-IL" smtClean="0"/>
-              <a:t>ט'/אדר א/תשפ"ב</a:t>
+              <a:t>כ"א/אדר א/תשפ"ב</a:t>
             </a:fld>
             <a:endParaRPr lang="he-IL"/>
           </a:p>
@@ -5329,7 +5329,7 @@
           <a:p>
             <a:fld id="{B3DC5803-524A-4535-9048-D4846558C48F}" type="datetimeFigureOut">
               <a:rPr lang="he-IL" smtClean="0"/>
-              <a:t>ט'/אדר א/תשפ"ב</a:t>
+              <a:t>כ"א/אדר א/תשפ"ב</a:t>
             </a:fld>
             <a:endParaRPr lang="he-IL"/>
           </a:p>
@@ -23332,7 +23332,7 @@
         </p:nvCxnSpPr>
         <p:spPr>
           <a:xfrm>
-            <a:off x="8987662" y="3033506"/>
+            <a:off x="8183291" y="6437033"/>
             <a:ext cx="2239861" cy="0"/>
           </a:xfrm>
           <a:prstGeom prst="line">
@@ -23375,7 +23375,7 @@
         </p:nvCxnSpPr>
         <p:spPr>
           <a:xfrm flipV="1">
-            <a:off x="8987662" y="810423"/>
+            <a:off x="8183291" y="4213950"/>
             <a:ext cx="0" cy="2223084"/>
           </a:xfrm>
           <a:prstGeom prst="line">
@@ -23416,7 +23416,7 @@
         </p:nvSpPr>
         <p:spPr>
           <a:xfrm>
-            <a:off x="8165945" y="1670294"/>
+            <a:off x="7361574" y="5073821"/>
             <a:ext cx="754605" cy="646331"/>
           </a:xfrm>
           <a:prstGeom prst="rect">
@@ -23460,7 +23460,7 @@
         </p:nvSpPr>
         <p:spPr>
           <a:xfrm>
-            <a:off x="9776228" y="3155146"/>
+            <a:off x="8971857" y="6558673"/>
             <a:ext cx="914400" cy="369332"/>
           </a:xfrm>
           <a:prstGeom prst="rect">
@@ -23496,8 +23496,8 @@
         </p:nvSpPr>
         <p:spPr>
           <a:xfrm>
-            <a:off x="9121887" y="425177"/>
-            <a:ext cx="2105636" cy="558661"/>
+            <a:off x="8317516" y="4079588"/>
+            <a:ext cx="2105636" cy="307777"/>
           </a:xfrm>
           <a:prstGeom prst="roundRect">
             <a:avLst/>
@@ -23529,54 +23529,6 @@
               <a:t>Screen</a:t>
             </a:r>
           </a:p>
-          <a:p>
-            <a:pPr algn="ctr"/>
-            <a:endParaRPr lang="he-IL" dirty="0"/>
-          </a:p>
-        </p:txBody>
-      </p:sp>
-      <p:sp>
-        <p:nvSpPr>
-          <p:cNvPr id="70" name="TextBox 69">
-            <a:extLst>
-              <a:ext uri="{FF2B5EF4-FFF2-40B4-BE49-F238E27FC236}">
-                <a16:creationId xmlns:a16="http://schemas.microsoft.com/office/drawing/2014/main" id="{3B326D6D-0AC2-4A8E-AB57-4C172F05959F}"/>
-              </a:ext>
-            </a:extLst>
-          </p:cNvPr>
-          <p:cNvSpPr txBox="1"/>
-          <p:nvPr/>
-        </p:nvSpPr>
-        <p:spPr>
-          <a:xfrm>
-            <a:off x="9113498" y="678227"/>
-            <a:ext cx="2239860" cy="307777"/>
-          </a:xfrm>
-          <a:prstGeom prst="rect">
-            <a:avLst/>
-          </a:prstGeom>
-          <a:noFill/>
-        </p:spPr>
-        <p:txBody>
-          <a:bodyPr wrap="square" rtlCol="1">
-            <a:spAutoFit/>
-          </a:bodyPr>
-          <a:lstStyle/>
-          <a:p>
-            <a:r>
-              <a:rPr lang="en-US" sz="1400" b="1" dirty="0">
-                <a:solidFill>
-                  <a:schemeClr val="bg1"/>
-                </a:solidFill>
-              </a:rPr>
-              <a:t>   A                                   B</a:t>
-            </a:r>
-            <a:endParaRPr lang="he-IL" sz="1400" b="1" dirty="0">
-              <a:solidFill>
-                <a:schemeClr val="bg1"/>
-              </a:solidFill>
-            </a:endParaRPr>
-          </a:p>
         </p:txBody>
       </p:sp>
       <p:cxnSp>
@@ -23593,7 +23545,7 @@
         </p:nvCxnSpPr>
         <p:spPr>
           <a:xfrm flipV="1">
-            <a:off x="10174705" y="983838"/>
+            <a:off x="9370334" y="4387365"/>
             <a:ext cx="669758" cy="2049668"/>
           </a:xfrm>
           <a:prstGeom prst="line">
@@ -23616,8 +23568,8 @@
           </a:fontRef>
         </p:style>
       </p:cxnSp>
-      <mc:AlternateContent xmlns:mc="http://schemas.openxmlformats.org/markup-compatibility/2006" xmlns:p14="http://schemas.microsoft.com/office/powerpoint/2010/main">
-        <mc:Choice Requires="p14">
+      <mc:AlternateContent xmlns:mc="http://schemas.openxmlformats.org/markup-compatibility/2006">
+        <mc:Choice xmlns:p14="http://schemas.microsoft.com/office/powerpoint/2010/main" Requires="p14">
           <p:contentPart p14:bwMode="auto" r:id="rId2">
             <p14:nvContentPartPr>
               <p14:cNvPr id="5" name="Ink 4">
@@ -23631,12 +23583,12 @@
               <p14:nvPr/>
             </p14:nvContentPartPr>
             <p14:xfrm>
-              <a:off x="10182265" y="976711"/>
+              <a:off x="9377894" y="4380238"/>
               <a:ext cx="668880" cy="2031480"/>
             </p14:xfrm>
           </p:contentPart>
         </mc:Choice>
-        <mc:Fallback xmlns="">
+        <mc:Fallback>
           <p:pic>
             <p:nvPicPr>
               <p:cNvPr id="5" name="Ink 4">
@@ -23657,8 +23609,8 @@
             </p:blipFill>
             <p:spPr>
               <a:xfrm>
-                <a:off x="10173625" y="968071"/>
-                <a:ext cx="686520" cy="2049120"/>
+                <a:off x="9368894" y="4371236"/>
+                <a:ext cx="686520" cy="2049123"/>
               </a:xfrm>
               <a:prstGeom prst="rect">
                 <a:avLst/>
@@ -23681,7 +23633,7 @@
         </p:nvCxnSpPr>
         <p:spPr>
           <a:xfrm>
-            <a:off x="10262935" y="1646228"/>
+            <a:off x="9458564" y="5049755"/>
             <a:ext cx="336884" cy="126422"/>
           </a:xfrm>
           <a:prstGeom prst="straightConnector1">
@@ -23724,7 +23676,7 @@
         </p:nvSpPr>
         <p:spPr>
           <a:xfrm rot="1046172">
-            <a:off x="10182749" y="1463570"/>
+            <a:off x="9378378" y="4867097"/>
             <a:ext cx="585516" cy="276999"/>
           </a:xfrm>
           <a:prstGeom prst="rect">
@@ -23761,7 +23713,7 @@
         </p:nvSpPr>
         <p:spPr>
           <a:xfrm>
-            <a:off x="10413501" y="2470845"/>
+            <a:off x="9609130" y="5874372"/>
             <a:ext cx="1170814" cy="523220"/>
           </a:xfrm>
           <a:prstGeom prst="rect">
@@ -29449,7 +29401,7 @@
         </p:nvCxnSpPr>
         <p:spPr>
           <a:xfrm>
-            <a:off x="4730117" y="6307175"/>
+            <a:off x="4638420" y="6406619"/>
             <a:ext cx="2239861" cy="0"/>
           </a:xfrm>
           <a:prstGeom prst="line">
@@ -29492,7 +29444,7 @@
         </p:nvCxnSpPr>
         <p:spPr>
           <a:xfrm flipV="1">
-            <a:off x="4730117" y="4084092"/>
+            <a:off x="4638420" y="4183536"/>
             <a:ext cx="0" cy="2223084"/>
           </a:xfrm>
           <a:prstGeom prst="line">
@@ -29533,7 +29485,7 @@
         </p:nvSpPr>
         <p:spPr>
           <a:xfrm>
-            <a:off x="3923932" y="4943963"/>
+            <a:off x="3832235" y="5043407"/>
             <a:ext cx="739074" cy="646331"/>
           </a:xfrm>
           <a:prstGeom prst="rect">
@@ -29577,7 +29529,7 @@
         </p:nvSpPr>
         <p:spPr>
           <a:xfrm>
-            <a:off x="5518683" y="6428815"/>
+            <a:off x="5426986" y="6528259"/>
             <a:ext cx="914400" cy="369332"/>
           </a:xfrm>
           <a:prstGeom prst="rect">
@@ -29613,7 +29565,7 @@
         </p:nvSpPr>
         <p:spPr>
           <a:xfrm>
-            <a:off x="4864341" y="4008591"/>
+            <a:off x="4772644" y="4108035"/>
             <a:ext cx="2105636" cy="377498"/>
           </a:xfrm>
           <a:prstGeom prst="roundRect">
@@ -29663,7 +29615,7 @@
         </p:nvSpPr>
         <p:spPr>
           <a:xfrm>
-            <a:off x="5251133" y="4409215"/>
+            <a:off x="5159436" y="4508659"/>
             <a:ext cx="665883" cy="1866900"/>
           </a:xfrm>
           <a:custGeom>
@@ -30385,7 +30337,7 @@
         </p:nvCxnSpPr>
         <p:spPr>
           <a:xfrm>
-            <a:off x="4730117" y="5642022"/>
+            <a:off x="4638420" y="5741466"/>
             <a:ext cx="679414" cy="0"/>
           </a:xfrm>
           <a:prstGeom prst="line">
@@ -30429,7 +30381,7 @@
         </p:nvSpPr>
         <p:spPr>
           <a:xfrm>
-            <a:off x="5363658" y="5608240"/>
+            <a:off x="5271961" y="5707684"/>
             <a:ext cx="91746" cy="80409"/>
           </a:xfrm>
           <a:prstGeom prst="ellipse">
@@ -30483,7 +30435,7 @@
         </p:nvSpPr>
         <p:spPr>
           <a:xfrm>
-            <a:off x="5463570" y="5817611"/>
+            <a:off x="5371873" y="5917055"/>
             <a:ext cx="91746" cy="80409"/>
           </a:xfrm>
           <a:prstGeom prst="ellipse">
@@ -30537,7 +30489,7 @@
         </p:nvSpPr>
         <p:spPr>
           <a:xfrm>
-            <a:off x="5588253" y="6007621"/>
+            <a:off x="5496556" y="6107065"/>
             <a:ext cx="91746" cy="80409"/>
           </a:xfrm>
           <a:prstGeom prst="ellipse">
@@ -30591,7 +30543,7 @@
         </p:nvSpPr>
         <p:spPr>
           <a:xfrm>
-            <a:off x="5004142" y="4964051"/>
+            <a:off x="4912445" y="5063495"/>
             <a:ext cx="514541" cy="253916"/>
           </a:xfrm>
           <a:prstGeom prst="rect">
@@ -30634,7 +30586,7 @@
         </p:nvCxnSpPr>
         <p:spPr>
           <a:xfrm flipV="1">
-            <a:off x="5917016" y="4386089"/>
+            <a:off x="5825319" y="4485533"/>
             <a:ext cx="143" cy="1890026"/>
           </a:xfrm>
           <a:prstGeom prst="line">
@@ -30678,7 +30630,7 @@
         </p:nvCxnSpPr>
         <p:spPr>
           <a:xfrm flipH="1">
-            <a:off x="5481848" y="5642022"/>
+            <a:off x="5390151" y="5741466"/>
             <a:ext cx="415147" cy="0"/>
           </a:xfrm>
           <a:prstGeom prst="straightConnector1">
@@ -30718,7 +30670,7 @@
         </p:nvSpPr>
         <p:spPr>
           <a:xfrm>
-            <a:off x="5288121" y="5149297"/>
+            <a:off x="5196424" y="5248741"/>
             <a:ext cx="783006" cy="461665"/>
           </a:xfrm>
           <a:prstGeom prst="rect">
@@ -30764,7 +30716,7 @@
         </p:nvCxnSpPr>
         <p:spPr>
           <a:xfrm flipH="1">
-            <a:off x="5579133" y="5846501"/>
+            <a:off x="5487436" y="5945945"/>
             <a:ext cx="308868" cy="0"/>
           </a:xfrm>
           <a:prstGeom prst="straightConnector1">
@@ -30806,7 +30758,7 @@
         </p:nvCxnSpPr>
         <p:spPr>
           <a:xfrm flipH="1">
-            <a:off x="5708931" y="6047665"/>
+            <a:off x="5617234" y="6147109"/>
             <a:ext cx="186237" cy="1"/>
           </a:xfrm>
           <a:prstGeom prst="straightConnector1">
@@ -30849,7 +30801,7 @@
         </p:nvCxnSpPr>
         <p:spPr>
           <a:xfrm>
-            <a:off x="4730117" y="5857815"/>
+            <a:off x="4638420" y="5957259"/>
             <a:ext cx="733453" cy="1"/>
           </a:xfrm>
           <a:prstGeom prst="line">
@@ -30896,7 +30848,7 @@
         </p:nvCxnSpPr>
         <p:spPr>
           <a:xfrm flipV="1">
-            <a:off x="4730117" y="6047826"/>
+            <a:off x="4638420" y="6147270"/>
             <a:ext cx="858136" cy="7446"/>
           </a:xfrm>
           <a:prstGeom prst="line">
@@ -30940,7 +30892,7 @@
         </p:nvSpPr>
         <p:spPr>
           <a:xfrm>
-            <a:off x="4399932" y="5923013"/>
+            <a:off x="4308235" y="6022457"/>
             <a:ext cx="465342" cy="261610"/>
           </a:xfrm>
           <a:prstGeom prst="rect">
@@ -30977,7 +30929,7 @@
         </p:nvSpPr>
         <p:spPr>
           <a:xfrm>
-            <a:off x="4399932" y="5711313"/>
+            <a:off x="4308235" y="5810757"/>
             <a:ext cx="465342" cy="261610"/>
           </a:xfrm>
           <a:prstGeom prst="rect">
@@ -31014,7 +30966,7 @@
         </p:nvSpPr>
         <p:spPr>
           <a:xfrm>
-            <a:off x="4399932" y="5505605"/>
+            <a:off x="4308235" y="5605049"/>
             <a:ext cx="465342" cy="261610"/>
           </a:xfrm>
           <a:prstGeom prst="rect">
@@ -31757,8 +31709,8 @@
           </a:p>
         </p:txBody>
       </p:sp>
-      <mc:AlternateContent xmlns:mc="http://schemas.openxmlformats.org/markup-compatibility/2006">
-        <mc:Choice xmlns:p14="http://schemas.microsoft.com/office/powerpoint/2010/main" Requires="p14">
+      <mc:AlternateContent xmlns:mc="http://schemas.openxmlformats.org/markup-compatibility/2006" xmlns:p14="http://schemas.microsoft.com/office/powerpoint/2010/main">
+        <mc:Choice Requires="p14">
           <p:contentPart p14:bwMode="auto" r:id="rId2">
             <p14:nvContentPartPr>
               <p14:cNvPr id="128" name="Ink 127">
@@ -31777,7 +31729,7 @@
             </p14:xfrm>
           </p:contentPart>
         </mc:Choice>
-        <mc:Fallback>
+        <mc:Fallback xmlns="">
           <p:pic>
             <p:nvPicPr>
               <p:cNvPr id="128" name="Ink 127">
@@ -31808,8 +31760,8 @@
           </p:pic>
         </mc:Fallback>
       </mc:AlternateContent>
-      <mc:AlternateContent xmlns:mc="http://schemas.openxmlformats.org/markup-compatibility/2006">
-        <mc:Choice xmlns:p14="http://schemas.microsoft.com/office/powerpoint/2010/main" Requires="p14">
+      <mc:AlternateContent xmlns:mc="http://schemas.openxmlformats.org/markup-compatibility/2006" xmlns:p14="http://schemas.microsoft.com/office/powerpoint/2010/main">
+        <mc:Choice Requires="p14">
           <p:contentPart p14:bwMode="auto" r:id="rId4">
             <p14:nvContentPartPr>
               <p14:cNvPr id="129" name="Ink 128">
@@ -31828,7 +31780,7 @@
             </p14:xfrm>
           </p:contentPart>
         </mc:Choice>
-        <mc:Fallback>
+        <mc:Fallback xmlns="">
           <p:pic>
             <p:nvPicPr>
               <p:cNvPr id="129" name="Ink 128">
@@ -33482,8 +33434,8 @@
           </a:p>
         </p:txBody>
       </p:sp>
-      <mc:AlternateContent xmlns:mc="http://schemas.openxmlformats.org/markup-compatibility/2006">
-        <mc:Choice xmlns:p14="http://schemas.microsoft.com/office/powerpoint/2010/main" Requires="p14">
+      <mc:AlternateContent xmlns:mc="http://schemas.openxmlformats.org/markup-compatibility/2006" xmlns:p14="http://schemas.microsoft.com/office/powerpoint/2010/main">
+        <mc:Choice Requires="p14">
           <p:contentPart p14:bwMode="auto" r:id="rId6">
             <p14:nvContentPartPr>
               <p14:cNvPr id="252" name="Ink 251">
@@ -33502,7 +33454,7 @@
             </p14:xfrm>
           </p:contentPart>
         </mc:Choice>
-        <mc:Fallback>
+        <mc:Fallback xmlns="">
           <p:pic>
             <p:nvPicPr>
               <p:cNvPr id="252" name="Ink 251">
@@ -33533,8 +33485,8 @@
           </p:pic>
         </mc:Fallback>
       </mc:AlternateContent>
-      <mc:AlternateContent xmlns:mc="http://schemas.openxmlformats.org/markup-compatibility/2006">
-        <mc:Choice xmlns:p14="http://schemas.microsoft.com/office/powerpoint/2010/main" Requires="p14">
+      <mc:AlternateContent xmlns:mc="http://schemas.openxmlformats.org/markup-compatibility/2006" xmlns:p14="http://schemas.microsoft.com/office/powerpoint/2010/main">
+        <mc:Choice Requires="p14">
           <p:contentPart p14:bwMode="auto" r:id="rId7">
             <p14:nvContentPartPr>
               <p14:cNvPr id="253" name="Ink 252">
@@ -33553,7 +33505,7 @@
             </p14:xfrm>
           </p:contentPart>
         </mc:Choice>
-        <mc:Fallback>
+        <mc:Fallback xmlns="">
           <p:pic>
             <p:nvPicPr>
               <p:cNvPr id="253" name="Ink 252">

</xml_diff>

<commit_message>
First draft of full pre-reg, before formatting.
</commit_message>
<xml_diff>
--- a/presentation/exp birds eye veiw.pptx
+++ b/presentation/exp birds eye veiw.pptx
@@ -2660,7 +2660,7 @@
           <a:p>
             <a:fld id="{B3DC5803-524A-4535-9048-D4846558C48F}" type="datetimeFigureOut">
               <a:rPr lang="he-IL" smtClean="0"/>
-              <a:t>כ"א/אדר א/תשפ"ב</a:t>
+              <a:t>י"א/ניסן/תשפ"ב</a:t>
             </a:fld>
             <a:endParaRPr lang="he-IL"/>
           </a:p>
@@ -2860,7 +2860,7 @@
           <a:p>
             <a:fld id="{B3DC5803-524A-4535-9048-D4846558C48F}" type="datetimeFigureOut">
               <a:rPr lang="he-IL" smtClean="0"/>
-              <a:t>כ"א/אדר א/תשפ"ב</a:t>
+              <a:t>י"א/ניסן/תשפ"ב</a:t>
             </a:fld>
             <a:endParaRPr lang="he-IL"/>
           </a:p>
@@ -3070,7 +3070,7 @@
           <a:p>
             <a:fld id="{B3DC5803-524A-4535-9048-D4846558C48F}" type="datetimeFigureOut">
               <a:rPr lang="he-IL" smtClean="0"/>
-              <a:t>כ"א/אדר א/תשפ"ב</a:t>
+              <a:t>י"א/ניסן/תשפ"ב</a:t>
             </a:fld>
             <a:endParaRPr lang="he-IL"/>
           </a:p>
@@ -3270,7 +3270,7 @@
           <a:p>
             <a:fld id="{B3DC5803-524A-4535-9048-D4846558C48F}" type="datetimeFigureOut">
               <a:rPr lang="he-IL" smtClean="0"/>
-              <a:t>כ"א/אדר א/תשפ"ב</a:t>
+              <a:t>י"א/ניסן/תשפ"ב</a:t>
             </a:fld>
             <a:endParaRPr lang="he-IL"/>
           </a:p>
@@ -3546,7 +3546,7 @@
           <a:p>
             <a:fld id="{B3DC5803-524A-4535-9048-D4846558C48F}" type="datetimeFigureOut">
               <a:rPr lang="he-IL" smtClean="0"/>
-              <a:t>כ"א/אדר א/תשפ"ב</a:t>
+              <a:t>י"א/ניסן/תשפ"ב</a:t>
             </a:fld>
             <a:endParaRPr lang="he-IL"/>
           </a:p>
@@ -3814,7 +3814,7 @@
           <a:p>
             <a:fld id="{B3DC5803-524A-4535-9048-D4846558C48F}" type="datetimeFigureOut">
               <a:rPr lang="he-IL" smtClean="0"/>
-              <a:t>כ"א/אדר א/תשפ"ב</a:t>
+              <a:t>י"א/ניסן/תשפ"ב</a:t>
             </a:fld>
             <a:endParaRPr lang="he-IL"/>
           </a:p>
@@ -4229,7 +4229,7 @@
           <a:p>
             <a:fld id="{B3DC5803-524A-4535-9048-D4846558C48F}" type="datetimeFigureOut">
               <a:rPr lang="he-IL" smtClean="0"/>
-              <a:t>כ"א/אדר א/תשפ"ב</a:t>
+              <a:t>י"א/ניסן/תשפ"ב</a:t>
             </a:fld>
             <a:endParaRPr lang="he-IL"/>
           </a:p>
@@ -4371,7 +4371,7 @@
           <a:p>
             <a:fld id="{B3DC5803-524A-4535-9048-D4846558C48F}" type="datetimeFigureOut">
               <a:rPr lang="he-IL" smtClean="0"/>
-              <a:t>כ"א/אדר א/תשפ"ב</a:t>
+              <a:t>י"א/ניסן/תשפ"ב</a:t>
             </a:fld>
             <a:endParaRPr lang="he-IL"/>
           </a:p>
@@ -4484,7 +4484,7 @@
           <a:p>
             <a:fld id="{B3DC5803-524A-4535-9048-D4846558C48F}" type="datetimeFigureOut">
               <a:rPr lang="he-IL" smtClean="0"/>
-              <a:t>כ"א/אדר א/תשפ"ב</a:t>
+              <a:t>י"א/ניסן/תשפ"ב</a:t>
             </a:fld>
             <a:endParaRPr lang="he-IL"/>
           </a:p>
@@ -4797,7 +4797,7 @@
           <a:p>
             <a:fld id="{B3DC5803-524A-4535-9048-D4846558C48F}" type="datetimeFigureOut">
               <a:rPr lang="he-IL" smtClean="0"/>
-              <a:t>כ"א/אדר א/תשפ"ב</a:t>
+              <a:t>י"א/ניסן/תשפ"ב</a:t>
             </a:fld>
             <a:endParaRPr lang="he-IL"/>
           </a:p>
@@ -5086,7 +5086,7 @@
           <a:p>
             <a:fld id="{B3DC5803-524A-4535-9048-D4846558C48F}" type="datetimeFigureOut">
               <a:rPr lang="he-IL" smtClean="0"/>
-              <a:t>כ"א/אדר א/תשפ"ב</a:t>
+              <a:t>י"א/ניסן/תשפ"ב</a:t>
             </a:fld>
             <a:endParaRPr lang="he-IL"/>
           </a:p>
@@ -5329,7 +5329,7 @@
           <a:p>
             <a:fld id="{B3DC5803-524A-4535-9048-D4846558C48F}" type="datetimeFigureOut">
               <a:rPr lang="he-IL" smtClean="0"/>
-              <a:t>כ"א/אדר א/תשפ"ב</a:t>
+              <a:t>י"א/ניסן/תשפ"ב</a:t>
             </a:fld>
             <a:endParaRPr lang="he-IL"/>
           </a:p>
@@ -23568,8 +23568,8 @@
           </a:fontRef>
         </p:style>
       </p:cxnSp>
-      <mc:AlternateContent xmlns:mc="http://schemas.openxmlformats.org/markup-compatibility/2006">
-        <mc:Choice xmlns:p14="http://schemas.microsoft.com/office/powerpoint/2010/main" Requires="p14">
+      <mc:AlternateContent xmlns:mc="http://schemas.openxmlformats.org/markup-compatibility/2006" xmlns:p14="http://schemas.microsoft.com/office/powerpoint/2010/main">
+        <mc:Choice Requires="p14">
           <p:contentPart p14:bwMode="auto" r:id="rId2">
             <p14:nvContentPartPr>
               <p14:cNvPr id="5" name="Ink 4">
@@ -23588,7 +23588,7 @@
             </p14:xfrm>
           </p:contentPart>
         </mc:Choice>
-        <mc:Fallback>
+        <mc:Fallback xmlns="">
           <p:pic>
             <p:nvPicPr>
               <p:cNvPr id="5" name="Ink 4">
@@ -31463,6 +31463,631 @@
           </p:txBody>
         </p:sp>
       </p:grpSp>
+      <p:sp>
+        <p:nvSpPr>
+          <p:cNvPr id="2" name="TextBox 1">
+            <a:extLst>
+              <a:ext uri="{FF2B5EF4-FFF2-40B4-BE49-F238E27FC236}">
+                <a16:creationId xmlns:a16="http://schemas.microsoft.com/office/drawing/2014/main" id="{C678002B-FF60-41A7-9A65-A6ABBFE4163E}"/>
+              </a:ext>
+            </a:extLst>
+          </p:cNvPr>
+          <p:cNvSpPr txBox="1"/>
+          <p:nvPr/>
+        </p:nvSpPr>
+        <p:spPr>
+          <a:xfrm>
+            <a:off x="3722927" y="2458452"/>
+            <a:ext cx="788916" cy="369332"/>
+          </a:xfrm>
+          <a:prstGeom prst="rect">
+            <a:avLst/>
+          </a:prstGeom>
+          <a:noFill/>
+        </p:spPr>
+        <p:txBody>
+          <a:bodyPr wrap="square" rtlCol="1">
+            <a:spAutoFit/>
+          </a:bodyPr>
+          <a:lstStyle/>
+          <a:p>
+            <a:pPr algn="ctr"/>
+            <a:r>
+              <a:rPr lang="en-US" dirty="0"/>
+              <a:t>Radio</a:t>
+            </a:r>
+            <a:endParaRPr lang="he-IL" dirty="0"/>
+          </a:p>
+        </p:txBody>
+      </p:sp>
+      <p:sp>
+        <p:nvSpPr>
+          <p:cNvPr id="14" name="TextBox 13">
+            <a:extLst>
+              <a:ext uri="{FF2B5EF4-FFF2-40B4-BE49-F238E27FC236}">
+                <a16:creationId xmlns:a16="http://schemas.microsoft.com/office/drawing/2014/main" id="{95C9426D-CA60-45A7-9B5C-B054BDFBCAFC}"/>
+              </a:ext>
+            </a:extLst>
+          </p:cNvPr>
+          <p:cNvSpPr txBox="1"/>
+          <p:nvPr/>
+        </p:nvSpPr>
+        <p:spPr>
+          <a:xfrm>
+            <a:off x="2911632" y="2176092"/>
+            <a:ext cx="1031886" cy="307777"/>
+          </a:xfrm>
+          <a:prstGeom prst="rect">
+            <a:avLst/>
+          </a:prstGeom>
+          <a:solidFill>
+            <a:srgbClr val="6F6F6F"/>
+          </a:solidFill>
+        </p:spPr>
+        <p:txBody>
+          <a:bodyPr wrap="square" rtlCol="1">
+            <a:spAutoFit/>
+          </a:bodyPr>
+          <a:lstStyle/>
+          <a:p>
+            <a:pPr algn="ctr"/>
+            <a:r>
+              <a:rPr lang="en-US" sz="1400" dirty="0"/>
+              <a:t>Artificial</a:t>
+            </a:r>
+            <a:endParaRPr lang="he-IL" sz="1400" dirty="0"/>
+          </a:p>
+        </p:txBody>
+      </p:sp>
+      <p:sp>
+        <p:nvSpPr>
+          <p:cNvPr id="16" name="TextBox 15">
+            <a:extLst>
+              <a:ext uri="{FF2B5EF4-FFF2-40B4-BE49-F238E27FC236}">
+                <a16:creationId xmlns:a16="http://schemas.microsoft.com/office/drawing/2014/main" id="{8CFAC7AF-1CAD-4B34-9743-EDC4F2029052}"/>
+              </a:ext>
+            </a:extLst>
+          </p:cNvPr>
+          <p:cNvSpPr txBox="1"/>
+          <p:nvPr/>
+        </p:nvSpPr>
+        <p:spPr>
+          <a:xfrm>
+            <a:off x="4261614" y="2176092"/>
+            <a:ext cx="1031886" cy="307777"/>
+          </a:xfrm>
+          <a:prstGeom prst="rect">
+            <a:avLst/>
+          </a:prstGeom>
+          <a:solidFill>
+            <a:srgbClr val="6F6F6F"/>
+          </a:solidFill>
+        </p:spPr>
+        <p:txBody>
+          <a:bodyPr wrap="square" rtlCol="1">
+            <a:spAutoFit/>
+          </a:bodyPr>
+          <a:lstStyle/>
+          <a:p>
+            <a:pPr algn="ctr"/>
+            <a:r>
+              <a:rPr lang="en-US" sz="1400" dirty="0"/>
+              <a:t>Natural</a:t>
+            </a:r>
+            <a:endParaRPr lang="he-IL" sz="1400" dirty="0"/>
+          </a:p>
+        </p:txBody>
+      </p:sp>
+      <p:cxnSp>
+        <p:nvCxnSpPr>
+          <p:cNvPr id="17" name="Straight Arrow Connector 16">
+            <a:extLst>
+              <a:ext uri="{FF2B5EF4-FFF2-40B4-BE49-F238E27FC236}">
+                <a16:creationId xmlns:a16="http://schemas.microsoft.com/office/drawing/2014/main" id="{B3964CC2-6D9E-4FBA-9B23-39A93FB96BDF}"/>
+              </a:ext>
+            </a:extLst>
+          </p:cNvPr>
+          <p:cNvCxnSpPr>
+            <a:cxnSpLocks/>
+          </p:cNvCxnSpPr>
+          <p:nvPr/>
+        </p:nvCxnSpPr>
+        <p:spPr>
+          <a:xfrm flipH="1" flipV="1">
+            <a:off x="5943600" y="3376753"/>
+            <a:ext cx="461359" cy="1847169"/>
+          </a:xfrm>
+          <a:prstGeom prst="straightConnector1">
+            <a:avLst/>
+          </a:prstGeom>
+          <a:ln w="38100">
+            <a:solidFill>
+              <a:schemeClr val="tx1"/>
+            </a:solidFill>
+            <a:headEnd type="triangle"/>
+            <a:tailEnd type="triangle"/>
+          </a:ln>
+        </p:spPr>
+        <p:style>
+          <a:lnRef idx="1">
+            <a:schemeClr val="accent1"/>
+          </a:lnRef>
+          <a:fillRef idx="0">
+            <a:schemeClr val="accent1"/>
+          </a:fillRef>
+          <a:effectRef idx="0">
+            <a:schemeClr val="accent1"/>
+          </a:effectRef>
+          <a:fontRef idx="minor">
+            <a:schemeClr val="tx1"/>
+          </a:fontRef>
+        </p:style>
+      </p:cxnSp>
+      <p:cxnSp>
+        <p:nvCxnSpPr>
+          <p:cNvPr id="19" name="Straight Arrow Connector 18">
+            <a:extLst>
+              <a:ext uri="{FF2B5EF4-FFF2-40B4-BE49-F238E27FC236}">
+                <a16:creationId xmlns:a16="http://schemas.microsoft.com/office/drawing/2014/main" id="{6911ACB2-ED0B-4FF5-8B77-B37781C4D89F}"/>
+              </a:ext>
+            </a:extLst>
+          </p:cNvPr>
+          <p:cNvCxnSpPr>
+            <a:cxnSpLocks/>
+          </p:cNvCxnSpPr>
+          <p:nvPr/>
+        </p:nvCxnSpPr>
+        <p:spPr>
+          <a:xfrm>
+            <a:off x="2142486" y="2686838"/>
+            <a:ext cx="179270" cy="692489"/>
+          </a:xfrm>
+          <a:prstGeom prst="straightConnector1">
+            <a:avLst/>
+          </a:prstGeom>
+          <a:ln w="38100">
+            <a:solidFill>
+              <a:schemeClr val="tx1"/>
+            </a:solidFill>
+            <a:headEnd type="triangle"/>
+            <a:tailEnd type="triangle"/>
+          </a:ln>
+        </p:spPr>
+        <p:style>
+          <a:lnRef idx="1">
+            <a:schemeClr val="accent1"/>
+          </a:lnRef>
+          <a:fillRef idx="0">
+            <a:schemeClr val="accent1"/>
+          </a:fillRef>
+          <a:effectRef idx="0">
+            <a:schemeClr val="accent1"/>
+          </a:effectRef>
+          <a:fontRef idx="minor">
+            <a:schemeClr val="tx1"/>
+          </a:fontRef>
+        </p:style>
+      </p:cxnSp>
+      <p:cxnSp>
+        <p:nvCxnSpPr>
+          <p:cNvPr id="28" name="Straight Connector 27">
+            <a:extLst>
+              <a:ext uri="{FF2B5EF4-FFF2-40B4-BE49-F238E27FC236}">
+                <a16:creationId xmlns:a16="http://schemas.microsoft.com/office/drawing/2014/main" id="{57617DD2-7248-4E26-B46F-7432AF9DDB5E}"/>
+              </a:ext>
+            </a:extLst>
+          </p:cNvPr>
+          <p:cNvCxnSpPr>
+            <a:cxnSpLocks/>
+          </p:cNvCxnSpPr>
+          <p:nvPr/>
+        </p:nvCxnSpPr>
+        <p:spPr>
+          <a:xfrm flipH="1">
+            <a:off x="2026024" y="2686838"/>
+            <a:ext cx="1810870" cy="0"/>
+          </a:xfrm>
+          <a:prstGeom prst="line">
+            <a:avLst/>
+          </a:prstGeom>
+          <a:ln w="19050">
+            <a:solidFill>
+              <a:schemeClr val="tx1"/>
+            </a:solidFill>
+            <a:prstDash val="sysDash"/>
+          </a:ln>
+        </p:spPr>
+        <p:style>
+          <a:lnRef idx="1">
+            <a:schemeClr val="accent1"/>
+          </a:lnRef>
+          <a:fillRef idx="0">
+            <a:schemeClr val="accent1"/>
+          </a:fillRef>
+          <a:effectRef idx="0">
+            <a:schemeClr val="accent1"/>
+          </a:effectRef>
+          <a:fontRef idx="minor">
+            <a:schemeClr val="tx1"/>
+          </a:fontRef>
+        </p:style>
+      </p:cxnSp>
+      <p:cxnSp>
+        <p:nvCxnSpPr>
+          <p:cNvPr id="29" name="Straight Connector 28">
+            <a:extLst>
+              <a:ext uri="{FF2B5EF4-FFF2-40B4-BE49-F238E27FC236}">
+                <a16:creationId xmlns:a16="http://schemas.microsoft.com/office/drawing/2014/main" id="{BB0AD97C-51C9-4355-8450-F84BC90BB590}"/>
+              </a:ext>
+            </a:extLst>
+          </p:cNvPr>
+          <p:cNvCxnSpPr>
+            <a:cxnSpLocks/>
+          </p:cNvCxnSpPr>
+          <p:nvPr/>
+        </p:nvCxnSpPr>
+        <p:spPr>
+          <a:xfrm flipH="1">
+            <a:off x="2232121" y="3376753"/>
+            <a:ext cx="1885264" cy="0"/>
+          </a:xfrm>
+          <a:prstGeom prst="line">
+            <a:avLst/>
+          </a:prstGeom>
+          <a:ln w="19050">
+            <a:solidFill>
+              <a:schemeClr val="tx1"/>
+            </a:solidFill>
+            <a:prstDash val="sysDash"/>
+          </a:ln>
+        </p:spPr>
+        <p:style>
+          <a:lnRef idx="1">
+            <a:schemeClr val="accent1"/>
+          </a:lnRef>
+          <a:fillRef idx="0">
+            <a:schemeClr val="accent1"/>
+          </a:fillRef>
+          <a:effectRef idx="0">
+            <a:schemeClr val="accent1"/>
+          </a:effectRef>
+          <a:fontRef idx="minor">
+            <a:schemeClr val="tx1"/>
+          </a:fontRef>
+        </p:style>
+      </p:cxnSp>
+      <p:cxnSp>
+        <p:nvCxnSpPr>
+          <p:cNvPr id="32" name="Straight Connector 31">
+            <a:extLst>
+              <a:ext uri="{FF2B5EF4-FFF2-40B4-BE49-F238E27FC236}">
+                <a16:creationId xmlns:a16="http://schemas.microsoft.com/office/drawing/2014/main" id="{C422BD9B-6223-4EA5-827E-236AB7F0F52A}"/>
+              </a:ext>
+            </a:extLst>
+          </p:cNvPr>
+          <p:cNvCxnSpPr>
+            <a:cxnSpLocks/>
+          </p:cNvCxnSpPr>
+          <p:nvPr/>
+        </p:nvCxnSpPr>
+        <p:spPr>
+          <a:xfrm flipH="1">
+            <a:off x="4210736" y="5259342"/>
+            <a:ext cx="2225923" cy="0"/>
+          </a:xfrm>
+          <a:prstGeom prst="line">
+            <a:avLst/>
+          </a:prstGeom>
+          <a:ln w="19050">
+            <a:solidFill>
+              <a:schemeClr val="tx1"/>
+            </a:solidFill>
+            <a:prstDash val="sysDash"/>
+          </a:ln>
+        </p:spPr>
+        <p:style>
+          <a:lnRef idx="1">
+            <a:schemeClr val="accent1"/>
+          </a:lnRef>
+          <a:fillRef idx="0">
+            <a:schemeClr val="accent1"/>
+          </a:fillRef>
+          <a:effectRef idx="0">
+            <a:schemeClr val="accent1"/>
+          </a:effectRef>
+          <a:fontRef idx="minor">
+            <a:schemeClr val="tx1"/>
+          </a:fontRef>
+        </p:style>
+      </p:cxnSp>
+      <p:cxnSp>
+        <p:nvCxnSpPr>
+          <p:cNvPr id="34" name="Straight Connector 33">
+            <a:extLst>
+              <a:ext uri="{FF2B5EF4-FFF2-40B4-BE49-F238E27FC236}">
+                <a16:creationId xmlns:a16="http://schemas.microsoft.com/office/drawing/2014/main" id="{302EFEBC-371A-4454-8288-AC4B5271202D}"/>
+              </a:ext>
+            </a:extLst>
+          </p:cNvPr>
+          <p:cNvCxnSpPr>
+            <a:cxnSpLocks/>
+          </p:cNvCxnSpPr>
+          <p:nvPr/>
+        </p:nvCxnSpPr>
+        <p:spPr>
+          <a:xfrm flipH="1">
+            <a:off x="4151834" y="3376753"/>
+            <a:ext cx="1791766" cy="0"/>
+          </a:xfrm>
+          <a:prstGeom prst="line">
+            <a:avLst/>
+          </a:prstGeom>
+          <a:ln w="19050">
+            <a:solidFill>
+              <a:schemeClr val="tx1"/>
+            </a:solidFill>
+            <a:prstDash val="sysDash"/>
+          </a:ln>
+        </p:spPr>
+        <p:style>
+          <a:lnRef idx="1">
+            <a:schemeClr val="accent1"/>
+          </a:lnRef>
+          <a:fillRef idx="0">
+            <a:schemeClr val="accent1"/>
+          </a:fillRef>
+          <a:effectRef idx="0">
+            <a:schemeClr val="accent1"/>
+          </a:effectRef>
+          <a:fontRef idx="minor">
+            <a:schemeClr val="tx1"/>
+          </a:fontRef>
+        </p:style>
+      </p:cxnSp>
+      <p:sp>
+        <p:nvSpPr>
+          <p:cNvPr id="38" name="TextBox 37">
+            <a:extLst>
+              <a:ext uri="{FF2B5EF4-FFF2-40B4-BE49-F238E27FC236}">
+                <a16:creationId xmlns:a16="http://schemas.microsoft.com/office/drawing/2014/main" id="{60D2B397-6C21-4EC6-84D8-DEF4C9A6E0D2}"/>
+              </a:ext>
+            </a:extLst>
+          </p:cNvPr>
+          <p:cNvSpPr txBox="1"/>
+          <p:nvPr/>
+        </p:nvSpPr>
+        <p:spPr>
+          <a:xfrm>
+            <a:off x="1501986" y="2859901"/>
+            <a:ext cx="840016" cy="369332"/>
+          </a:xfrm>
+          <a:prstGeom prst="rect">
+            <a:avLst/>
+          </a:prstGeom>
+          <a:noFill/>
+        </p:spPr>
+        <p:txBody>
+          <a:bodyPr wrap="square" rtlCol="1">
+            <a:spAutoFit/>
+          </a:bodyPr>
+          <a:lstStyle/>
+          <a:p>
+            <a:pPr algn="ctr"/>
+            <a:r>
+              <a:rPr lang="en-US" dirty="0"/>
+              <a:t>24cm</a:t>
+            </a:r>
+            <a:endParaRPr lang="he-IL" dirty="0"/>
+          </a:p>
+        </p:txBody>
+      </p:sp>
+      <p:sp>
+        <p:nvSpPr>
+          <p:cNvPr id="39" name="TextBox 38">
+            <a:extLst>
+              <a:ext uri="{FF2B5EF4-FFF2-40B4-BE49-F238E27FC236}">
+                <a16:creationId xmlns:a16="http://schemas.microsoft.com/office/drawing/2014/main" id="{94676B2E-FD37-49FF-939A-4C1B56508111}"/>
+              </a:ext>
+            </a:extLst>
+          </p:cNvPr>
+          <p:cNvSpPr txBox="1"/>
+          <p:nvPr/>
+        </p:nvSpPr>
+        <p:spPr>
+          <a:xfrm>
+            <a:off x="6074544" y="4001022"/>
+            <a:ext cx="840016" cy="369332"/>
+          </a:xfrm>
+          <a:prstGeom prst="rect">
+            <a:avLst/>
+          </a:prstGeom>
+          <a:noFill/>
+        </p:spPr>
+        <p:txBody>
+          <a:bodyPr wrap="square" rtlCol="1">
+            <a:spAutoFit/>
+          </a:bodyPr>
+          <a:lstStyle/>
+          <a:p>
+            <a:pPr algn="ctr"/>
+            <a:r>
+              <a:rPr lang="en-US" dirty="0"/>
+              <a:t>35cm</a:t>
+            </a:r>
+            <a:endParaRPr lang="he-IL" dirty="0"/>
+          </a:p>
+        </p:txBody>
+      </p:sp>
+      <p:cxnSp>
+        <p:nvCxnSpPr>
+          <p:cNvPr id="40" name="Straight Arrow Connector 39">
+            <a:extLst>
+              <a:ext uri="{FF2B5EF4-FFF2-40B4-BE49-F238E27FC236}">
+                <a16:creationId xmlns:a16="http://schemas.microsoft.com/office/drawing/2014/main" id="{1BA74B79-9AE2-4CBA-8AFE-B138B4797204}"/>
+              </a:ext>
+            </a:extLst>
+          </p:cNvPr>
+          <p:cNvCxnSpPr>
+            <a:cxnSpLocks/>
+          </p:cNvCxnSpPr>
+          <p:nvPr/>
+        </p:nvCxnSpPr>
+        <p:spPr>
+          <a:xfrm>
+            <a:off x="3514165" y="3019441"/>
+            <a:ext cx="539085" cy="6345"/>
+          </a:xfrm>
+          <a:prstGeom prst="straightConnector1">
+            <a:avLst/>
+          </a:prstGeom>
+          <a:ln w="38100">
+            <a:solidFill>
+              <a:schemeClr val="tx1"/>
+            </a:solidFill>
+            <a:headEnd type="triangle"/>
+            <a:tailEnd type="triangle"/>
+          </a:ln>
+        </p:spPr>
+        <p:style>
+          <a:lnRef idx="1">
+            <a:schemeClr val="accent1"/>
+          </a:lnRef>
+          <a:fillRef idx="0">
+            <a:schemeClr val="accent1"/>
+          </a:fillRef>
+          <a:effectRef idx="0">
+            <a:schemeClr val="accent1"/>
+          </a:effectRef>
+          <a:fontRef idx="minor">
+            <a:schemeClr val="tx1"/>
+          </a:fontRef>
+        </p:style>
+      </p:cxnSp>
+      <p:sp>
+        <p:nvSpPr>
+          <p:cNvPr id="41" name="TextBox 40">
+            <a:extLst>
+              <a:ext uri="{FF2B5EF4-FFF2-40B4-BE49-F238E27FC236}">
+                <a16:creationId xmlns:a16="http://schemas.microsoft.com/office/drawing/2014/main" id="{0519A2C4-0337-4FB7-9876-7C1C1E839ACF}"/>
+              </a:ext>
+            </a:extLst>
+          </p:cNvPr>
+          <p:cNvSpPr txBox="1"/>
+          <p:nvPr/>
+        </p:nvSpPr>
+        <p:spPr>
+          <a:xfrm>
+            <a:off x="3363699" y="2975304"/>
+            <a:ext cx="840016" cy="369332"/>
+          </a:xfrm>
+          <a:prstGeom prst="rect">
+            <a:avLst/>
+          </a:prstGeom>
+          <a:noFill/>
+        </p:spPr>
+        <p:txBody>
+          <a:bodyPr wrap="square" rtlCol="1">
+            <a:spAutoFit/>
+          </a:bodyPr>
+          <a:lstStyle/>
+          <a:p>
+            <a:pPr algn="ctr"/>
+            <a:r>
+              <a:rPr lang="en-US" dirty="0"/>
+              <a:t>10cm</a:t>
+            </a:r>
+            <a:endParaRPr lang="he-IL" dirty="0"/>
+          </a:p>
+        </p:txBody>
+      </p:sp>
+      <p:cxnSp>
+        <p:nvCxnSpPr>
+          <p:cNvPr id="44" name="Straight Connector 43">
+            <a:extLst>
+              <a:ext uri="{FF2B5EF4-FFF2-40B4-BE49-F238E27FC236}">
+                <a16:creationId xmlns:a16="http://schemas.microsoft.com/office/drawing/2014/main" id="{2EB7046D-56CE-4B63-8682-C833318CDC0E}"/>
+              </a:ext>
+            </a:extLst>
+          </p:cNvPr>
+          <p:cNvCxnSpPr>
+            <a:cxnSpLocks/>
+          </p:cNvCxnSpPr>
+          <p:nvPr/>
+        </p:nvCxnSpPr>
+        <p:spPr>
+          <a:xfrm>
+            <a:off x="3452202" y="2686838"/>
+            <a:ext cx="34642" cy="344477"/>
+          </a:xfrm>
+          <a:prstGeom prst="line">
+            <a:avLst/>
+          </a:prstGeom>
+          <a:ln w="19050">
+            <a:solidFill>
+              <a:schemeClr val="tx1"/>
+            </a:solidFill>
+            <a:prstDash val="sysDash"/>
+          </a:ln>
+        </p:spPr>
+        <p:style>
+          <a:lnRef idx="1">
+            <a:schemeClr val="accent1"/>
+          </a:lnRef>
+          <a:fillRef idx="0">
+            <a:schemeClr val="accent1"/>
+          </a:fillRef>
+          <a:effectRef idx="0">
+            <a:schemeClr val="accent1"/>
+          </a:effectRef>
+          <a:fontRef idx="minor">
+            <a:schemeClr val="tx1"/>
+          </a:fontRef>
+        </p:style>
+      </p:cxnSp>
+      <p:cxnSp>
+        <p:nvCxnSpPr>
+          <p:cNvPr id="48" name="Straight Connector 47">
+            <a:extLst>
+              <a:ext uri="{FF2B5EF4-FFF2-40B4-BE49-F238E27FC236}">
+                <a16:creationId xmlns:a16="http://schemas.microsoft.com/office/drawing/2014/main" id="{0F8E9BEA-BEA3-4B3A-97BC-38DA68487807}"/>
+              </a:ext>
+            </a:extLst>
+          </p:cNvPr>
+          <p:cNvCxnSpPr>
+            <a:cxnSpLocks/>
+          </p:cNvCxnSpPr>
+          <p:nvPr/>
+        </p:nvCxnSpPr>
+        <p:spPr>
+          <a:xfrm>
+            <a:off x="4111161" y="2729306"/>
+            <a:ext cx="0" cy="315261"/>
+          </a:xfrm>
+          <a:prstGeom prst="line">
+            <a:avLst/>
+          </a:prstGeom>
+          <a:ln w="19050">
+            <a:solidFill>
+              <a:schemeClr val="tx1"/>
+            </a:solidFill>
+            <a:prstDash val="sysDash"/>
+          </a:ln>
+        </p:spPr>
+        <p:style>
+          <a:lnRef idx="1">
+            <a:schemeClr val="accent1"/>
+          </a:lnRef>
+          <a:fillRef idx="0">
+            <a:schemeClr val="accent1"/>
+          </a:fillRef>
+          <a:effectRef idx="0">
+            <a:schemeClr val="accent1"/>
+          </a:effectRef>
+          <a:fontRef idx="minor">
+            <a:schemeClr val="tx1"/>
+          </a:fontRef>
+        </p:style>
+      </p:cxnSp>
     </p:spTree>
     <p:extLst>
       <p:ext uri="{BB962C8B-B14F-4D97-AF65-F5344CB8AC3E}">

</xml_diff>